<commit_message>
Removal of the abridged version, which is no longer to date.
</commit_message>
<xml_diff>
--- a/iof-hierarchy-slidedeckpptx.pptx
+++ b/iof-hierarchy-slidedeckpptx.pptx
@@ -5,15 +5,14 @@
     <p:sldMasterId id="2147483648" r:id="rId1"/>
   </p:sldMasterIdLst>
   <p:notesMasterIdLst>
-    <p:notesMasterId r:id="rId8"/>
+    <p:notesMasterId r:id="rId7"/>
   </p:notesMasterIdLst>
   <p:sldIdLst>
     <p:sldId id="256" r:id="rId2"/>
-    <p:sldId id="257" r:id="rId3"/>
-    <p:sldId id="258" r:id="rId4"/>
-    <p:sldId id="259" r:id="rId5"/>
-    <p:sldId id="260" r:id="rId6"/>
-    <p:sldId id="261" r:id="rId7"/>
+    <p:sldId id="258" r:id="rId3"/>
+    <p:sldId id="259" r:id="rId4"/>
+    <p:sldId id="260" r:id="rId5"/>
+    <p:sldId id="261" r:id="rId6"/>
   </p:sldIdLst>
   <p:sldSz cx="12192000" cy="6858000"/>
   <p:notesSz cx="6858000" cy="9144000"/>
@@ -112,6 +111,11 @@
       </a:defRPr>
     </a:lvl9pPr>
   </p:defaultTextStyle>
+  <p:extLst>
+    <p:ext uri="{EFAFB233-063F-42B5-8137-9DF3F51BA10A}">
+      <p15:sldGuideLst xmlns:p15="http://schemas.microsoft.com/office/powerpoint/2012/main"/>
+    </p:ext>
+  </p:extLst>
 </p:presentation>
 </file>
 
@@ -597,7 +601,7 @@
           <a:p>
             <a:r>
               <a:rPr lang="en-US" dirty="0"/>
-              <a:t>abridged</a:t>
+              <a:t>Independent Continuant</a:t>
             </a:r>
           </a:p>
         </p:txBody>
@@ -628,7 +632,7 @@
     </p:spTree>
     <p:extLst>
       <p:ext uri="{BB962C8B-B14F-4D97-AF65-F5344CB8AC3E}">
-        <p14:creationId xmlns:p14="http://schemas.microsoft.com/office/powerpoint/2010/main" val="3452257182"/>
+        <p14:creationId xmlns:p14="http://schemas.microsoft.com/office/powerpoint/2010/main" val="2542197252"/>
       </p:ext>
     </p:extLst>
   </p:cSld>
@@ -684,7 +688,7 @@
           <a:p>
             <a:r>
               <a:rPr lang="en-US" dirty="0"/>
-              <a:t>Independent Continuant</a:t>
+              <a:t>Generically Dependent Continuant</a:t>
             </a:r>
           </a:p>
         </p:txBody>
@@ -715,7 +719,7 @@
     </p:spTree>
     <p:extLst>
       <p:ext uri="{BB962C8B-B14F-4D97-AF65-F5344CB8AC3E}">
-        <p14:creationId xmlns:p14="http://schemas.microsoft.com/office/powerpoint/2010/main" val="2542197252"/>
+        <p14:creationId xmlns:p14="http://schemas.microsoft.com/office/powerpoint/2010/main" val="3839209716"/>
       </p:ext>
     </p:extLst>
   </p:cSld>
@@ -771,7 +775,7 @@
           <a:p>
             <a:r>
               <a:rPr lang="en-US" dirty="0"/>
-              <a:t>Generically Dependent Continuant</a:t>
+              <a:t>Occurrent</a:t>
             </a:r>
           </a:p>
         </p:txBody>
@@ -802,7 +806,7 @@
     </p:spTree>
     <p:extLst>
       <p:ext uri="{BB962C8B-B14F-4D97-AF65-F5344CB8AC3E}">
-        <p14:creationId xmlns:p14="http://schemas.microsoft.com/office/powerpoint/2010/main" val="3839209716"/>
+        <p14:creationId xmlns:p14="http://schemas.microsoft.com/office/powerpoint/2010/main" val="926017169"/>
       </p:ext>
     </p:extLst>
   </p:cSld>
@@ -858,7 +862,7 @@
           <a:p>
             <a:r>
               <a:rPr lang="en-US" dirty="0"/>
-              <a:t>Occurrent</a:t>
+              <a:t>Specifically Dependent Continuant</a:t>
             </a:r>
           </a:p>
         </p:txBody>
@@ -881,93 +885,6 @@
             <a:fld id="{07C593CD-AFF0-B54C-9F82-453784AEBD8C}" type="slidenum">
               <a:rPr lang="en-US" smtClean="0"/>
               <a:t>5</a:t>
-            </a:fld>
-            <a:endParaRPr lang="en-US"/>
-          </a:p>
-        </p:txBody>
-      </p:sp>
-    </p:spTree>
-    <p:extLst>
-      <p:ext uri="{BB962C8B-B14F-4D97-AF65-F5344CB8AC3E}">
-        <p14:creationId xmlns:p14="http://schemas.microsoft.com/office/powerpoint/2010/main" val="926017169"/>
-      </p:ext>
-    </p:extLst>
-  </p:cSld>
-  <p:clrMapOvr>
-    <a:masterClrMapping/>
-  </p:clrMapOvr>
-</p:notes>
-</file>
-
-<file path=ppt/notesSlides/notesSlide6.xml><?xml version="1.0" encoding="utf-8"?>
-<p:notes xmlns:a="http://schemas.openxmlformats.org/drawingml/2006/main" xmlns:r="http://schemas.openxmlformats.org/officeDocument/2006/relationships" xmlns:p="http://schemas.openxmlformats.org/presentationml/2006/main">
-  <p:cSld>
-    <p:spTree>
-      <p:nvGrpSpPr>
-        <p:cNvPr id="1" name=""/>
-        <p:cNvGrpSpPr/>
-        <p:nvPr/>
-      </p:nvGrpSpPr>
-      <p:grpSpPr>
-        <a:xfrm>
-          <a:off x="0" y="0"/>
-          <a:ext cx="0" cy="0"/>
-          <a:chOff x="0" y="0"/>
-          <a:chExt cx="0" cy="0"/>
-        </a:xfrm>
-      </p:grpSpPr>
-      <p:sp>
-        <p:nvSpPr>
-          <p:cNvPr id="2" name="Slide Image Placeholder 1"/>
-          <p:cNvSpPr>
-            <a:spLocks noGrp="1" noRot="1" noChangeAspect="1"/>
-          </p:cNvSpPr>
-          <p:nvPr>
-            <p:ph type="sldImg"/>
-          </p:nvPr>
-        </p:nvSpPr>
-        <p:spPr/>
-      </p:sp>
-      <p:sp>
-        <p:nvSpPr>
-          <p:cNvPr id="3" name="Notes Placeholder 2"/>
-          <p:cNvSpPr>
-            <a:spLocks noGrp="1"/>
-          </p:cNvSpPr>
-          <p:nvPr>
-            <p:ph type="body" idx="1"/>
-          </p:nvPr>
-        </p:nvSpPr>
-        <p:spPr/>
-        <p:txBody>
-          <a:bodyPr/>
-          <a:lstStyle/>
-          <a:p>
-            <a:r>
-              <a:rPr lang="en-US" dirty="0"/>
-              <a:t>Specifically Dependent Continuant</a:t>
-            </a:r>
-          </a:p>
-        </p:txBody>
-      </p:sp>
-      <p:sp>
-        <p:nvSpPr>
-          <p:cNvPr id="4" name="Slide Number Placeholder 3"/>
-          <p:cNvSpPr>
-            <a:spLocks noGrp="1"/>
-          </p:cNvSpPr>
-          <p:nvPr>
-            <p:ph type="sldNum" sz="quarter" idx="5"/>
-          </p:nvPr>
-        </p:nvSpPr>
-        <p:spPr/>
-        <p:txBody>
-          <a:bodyPr/>
-          <a:lstStyle/>
-          <a:p>
-            <a:fld id="{07C593CD-AFF0-B54C-9F82-453784AEBD8C}" type="slidenum">
-              <a:rPr lang="en-US" smtClean="0"/>
-              <a:t>6</a:t>
             </a:fld>
             <a:endParaRPr lang="en-US"/>
           </a:p>
@@ -4265,66 +4182,6 @@
           <p:cNvPr id="3" name="Picture 2">
             <a:extLst>
               <a:ext uri="{FF2B5EF4-FFF2-40B4-BE49-F238E27FC236}">
-                <a16:creationId xmlns:a16="http://schemas.microsoft.com/office/drawing/2014/main" id="{2A5342A6-F5D3-C548-AA9E-ACD4A2F1B5C9}"/>
-              </a:ext>
-            </a:extLst>
-          </p:cNvPr>
-          <p:cNvPicPr>
-            <a:picLocks noChangeAspect="1"/>
-          </p:cNvPicPr>
-          <p:nvPr/>
-        </p:nvPicPr>
-        <p:blipFill>
-          <a:blip r:embed="rId3"/>
-          <a:stretch>
-            <a:fillRect/>
-          </a:stretch>
-        </p:blipFill>
-        <p:spPr>
-          <a:xfrm>
-            <a:off x="0" y="506403"/>
-            <a:ext cx="12192000" cy="5845193"/>
-          </a:xfrm>
-          <a:prstGeom prst="rect">
-            <a:avLst/>
-          </a:prstGeom>
-        </p:spPr>
-      </p:pic>
-    </p:spTree>
-    <p:extLst>
-      <p:ext uri="{BB962C8B-B14F-4D97-AF65-F5344CB8AC3E}">
-        <p14:creationId xmlns:p14="http://schemas.microsoft.com/office/powerpoint/2010/main" val="2131215821"/>
-      </p:ext>
-    </p:extLst>
-  </p:cSld>
-  <p:clrMapOvr>
-    <a:masterClrMapping/>
-  </p:clrMapOvr>
-</p:sld>
-</file>
-
-<file path=ppt/slides/slide3.xml><?xml version="1.0" encoding="utf-8"?>
-<p:sld xmlns:a="http://schemas.openxmlformats.org/drawingml/2006/main" xmlns:r="http://schemas.openxmlformats.org/officeDocument/2006/relationships" xmlns:p="http://schemas.openxmlformats.org/presentationml/2006/main">
-  <p:cSld>
-    <p:spTree>
-      <p:nvGrpSpPr>
-        <p:cNvPr id="1" name=""/>
-        <p:cNvGrpSpPr/>
-        <p:nvPr/>
-      </p:nvGrpSpPr>
-      <p:grpSpPr>
-        <a:xfrm>
-          <a:off x="0" y="0"/>
-          <a:ext cx="0" cy="0"/>
-          <a:chOff x="0" y="0"/>
-          <a:chExt cx="0" cy="0"/>
-        </a:xfrm>
-      </p:grpSpPr>
-      <p:pic>
-        <p:nvPicPr>
-          <p:cNvPr id="3" name="Picture 2">
-            <a:extLst>
-              <a:ext uri="{FF2B5EF4-FFF2-40B4-BE49-F238E27FC236}">
                 <a16:creationId xmlns:a16="http://schemas.microsoft.com/office/drawing/2014/main" id="{680FAADD-C586-DD4C-AF00-15B14EA53056}"/>
               </a:ext>
             </a:extLst>
@@ -4363,7 +4220,7 @@
 </p:sld>
 </file>
 
-<file path=ppt/slides/slide4.xml><?xml version="1.0" encoding="utf-8"?>
+<file path=ppt/slides/slide3.xml><?xml version="1.0" encoding="utf-8"?>
 <p:sld xmlns:a="http://schemas.openxmlformats.org/drawingml/2006/main" xmlns:r="http://schemas.openxmlformats.org/officeDocument/2006/relationships" xmlns:p="http://schemas.openxmlformats.org/presentationml/2006/main">
   <p:cSld>
     <p:spTree>
@@ -4423,7 +4280,7 @@
 </p:sld>
 </file>
 
-<file path=ppt/slides/slide5.xml><?xml version="1.0" encoding="utf-8"?>
+<file path=ppt/slides/slide4.xml><?xml version="1.0" encoding="utf-8"?>
 <p:sld xmlns:a="http://schemas.openxmlformats.org/drawingml/2006/main" xmlns:r="http://schemas.openxmlformats.org/officeDocument/2006/relationships" xmlns:p="http://schemas.openxmlformats.org/presentationml/2006/main">
   <p:cSld>
     <p:spTree>
@@ -4483,7 +4340,7 @@
 </p:sld>
 </file>
 
-<file path=ppt/slides/slide6.xml><?xml version="1.0" encoding="utf-8"?>
+<file path=ppt/slides/slide5.xml><?xml version="1.0" encoding="utf-8"?>
 <p:sld xmlns:a="http://schemas.openxmlformats.org/drawingml/2006/main" xmlns:r="http://schemas.openxmlformats.org/officeDocument/2006/relationships" xmlns:p="http://schemas.openxmlformats.org/presentationml/2006/main">
   <p:cSld>
     <p:spTree>

</xml_diff>